<commit_message>
2 days before defence
</commit_message>
<xml_diff>
--- a/Презентация.pptx
+++ b/Презентация.pptx
@@ -8,9 +8,11 @@
     <p:sldId id="256" r:id="rId2"/>
     <p:sldId id="257" r:id="rId3"/>
     <p:sldId id="258" r:id="rId4"/>
-    <p:sldId id="259" r:id="rId5"/>
-    <p:sldId id="260" r:id="rId6"/>
-    <p:sldId id="261" r:id="rId7"/>
+    <p:sldId id="262" r:id="rId5"/>
+    <p:sldId id="259" r:id="rId6"/>
+    <p:sldId id="263" r:id="rId7"/>
+    <p:sldId id="260" r:id="rId8"/>
+    <p:sldId id="261" r:id="rId9"/>
   </p:sldIdLst>
   <p:sldSz cx="12192000" cy="6858000"/>
   <p:notesSz cx="6858000" cy="9144000"/>
@@ -109,6 +111,11 @@
       </a:defRPr>
     </a:lvl9pPr>
   </p:defaultTextStyle>
+  <p:extLst>
+    <p:ext uri="{EFAFB233-063F-42B5-8137-9DF3F51BA10A}">
+      <p15:sldGuideLst xmlns:p15="http://schemas.microsoft.com/office/powerpoint/2012/main"/>
+    </p:ext>
+  </p:extLst>
 </p:presentation>
 </file>
 
@@ -3238,7 +3245,7 @@
           <a:p>
             <a:fld id="{6AD6EE87-EBD5-4F12-A48A-63ACA297AC8F}" type="datetimeFigureOut">
               <a:rPr lang="en-US" smtClean="0"/>
-              <a:t>6/13/2020</a:t>
+              <a:t>7/3/2020</a:t>
             </a:fld>
             <a:endParaRPr lang="en-US" dirty="0"/>
           </a:p>
@@ -3443,7 +3450,7 @@
           <a:p>
             <a:fld id="{4CD73815-2707-4475-8F1A-B873CB631BB4}" type="datetimeFigureOut">
               <a:rPr lang="en-US" smtClean="0"/>
-              <a:t>6/13/2020</a:t>
+              <a:t>7/3/2020</a:t>
             </a:fld>
             <a:endParaRPr lang="en-US" dirty="0"/>
           </a:p>
@@ -3623,7 +3630,7 @@
           <a:p>
             <a:fld id="{2A4AFB99-0EAB-4182-AFF8-E214C82A68F6}" type="datetimeFigureOut">
               <a:rPr lang="en-US" smtClean="0"/>
-              <a:t>6/13/2020</a:t>
+              <a:t>7/3/2020</a:t>
             </a:fld>
             <a:endParaRPr lang="en-US" dirty="0"/>
           </a:p>
@@ -3828,7 +3835,7 @@
           <a:p>
             <a:fld id="{A5D3794B-289A-4A80-97D7-111025398D45}" type="datetimeFigureOut">
               <a:rPr lang="en-US" smtClean="0"/>
-              <a:t>6/13/2020</a:t>
+              <a:t>7/3/2020</a:t>
             </a:fld>
             <a:endParaRPr lang="en-US" dirty="0"/>
           </a:p>
@@ -4123,7 +4130,7 @@
           <a:p>
             <a:fld id="{5A61015F-7CC6-4D0A-9D87-873EA4C304CC}" type="datetimeFigureOut">
               <a:rPr lang="en-US" smtClean="0"/>
-              <a:t>6/13/2020</a:t>
+              <a:t>7/3/2020</a:t>
             </a:fld>
             <a:endParaRPr lang="en-US" dirty="0"/>
           </a:p>
@@ -4395,7 +4402,7 @@
           <a:p>
             <a:fld id="{93C6A301-0538-44EC-B09D-202E1042A48B}" type="datetimeFigureOut">
               <a:rPr lang="en-US" smtClean="0"/>
-              <a:t>6/13/2020</a:t>
+              <a:t>7/3/2020</a:t>
             </a:fld>
             <a:endParaRPr lang="en-US" dirty="0"/>
           </a:p>
@@ -4802,7 +4809,7 @@
           <a:p>
             <a:fld id="{D789574A-8875-45EF-8EA2-3CAA0F7ABC4C}" type="datetimeFigureOut">
               <a:rPr lang="en-US" smtClean="0"/>
-              <a:t>6/13/2020</a:t>
+              <a:t>7/3/2020</a:t>
             </a:fld>
             <a:endParaRPr lang="en-US" dirty="0"/>
           </a:p>
@@ -4920,7 +4927,7 @@
           <a:p>
             <a:fld id="{67EF4D4C-5367-4C26-9E2B-D8088D7FCA81}" type="datetimeFigureOut">
               <a:rPr lang="en-US" smtClean="0"/>
-              <a:t>6/13/2020</a:t>
+              <a:t>7/3/2020</a:t>
             </a:fld>
             <a:endParaRPr lang="en-US" dirty="0"/>
           </a:p>
@@ -5015,7 +5022,7 @@
           <a:p>
             <a:fld id="{56E91E96-98B0-4413-9547-46F3504108EF}" type="datetimeFigureOut">
               <a:rPr lang="en-US" smtClean="0"/>
-              <a:t>6/13/2020</a:t>
+              <a:t>7/3/2020</a:t>
             </a:fld>
             <a:endParaRPr lang="en-US" dirty="0"/>
           </a:p>
@@ -5305,7 +5312,7 @@
           <a:p>
             <a:fld id="{05C68B11-C5A8-448C-8CE9-B1A273C79CFC}" type="datetimeFigureOut">
               <a:rPr lang="en-US" smtClean="0"/>
-              <a:t>6/13/2020</a:t>
+              <a:t>7/3/2020</a:t>
             </a:fld>
             <a:endParaRPr lang="en-US" dirty="0"/>
           </a:p>
@@ -5585,7 +5592,7 @@
           <a:p>
             <a:fld id="{C7616CA0-919D-4A49-9C8A-62FDFB3A5183}" type="datetimeFigureOut">
               <a:rPr lang="en-US" smtClean="0"/>
-              <a:t>6/13/2020</a:t>
+              <a:t>7/3/2020</a:t>
             </a:fld>
             <a:endParaRPr lang="en-US" dirty="0"/>
           </a:p>
@@ -5836,7 +5843,7 @@
             <a:fld id="{90298CD5-6C1E-4009-B41F-6DF62E31D3BE}" type="datetimeFigureOut">
               <a:rPr lang="en-US" smtClean="0"/>
               <a:pPr/>
-              <a:t>6/13/2020</a:t>
+              <a:t>7/3/2020</a:t>
             </a:fld>
             <a:endParaRPr lang="en-US" dirty="0"/>
           </a:p>
@@ -6891,6 +6898,166 @@
           <p:cNvPr id="2" name="Заголовок 1">
             <a:extLst>
               <a:ext uri="{FF2B5EF4-FFF2-40B4-BE49-F238E27FC236}">
+                <a16:creationId xmlns:a16="http://schemas.microsoft.com/office/drawing/2014/main" id="{A52AC4E6-8650-434B-B9D9-D914FE921B61}"/>
+              </a:ext>
+            </a:extLst>
+          </p:cNvPr>
+          <p:cNvSpPr>
+            <a:spLocks noGrp="1"/>
+          </p:cNvSpPr>
+          <p:nvPr>
+            <p:ph type="title"/>
+          </p:nvPr>
+        </p:nvSpPr>
+        <p:spPr>
+          <a:xfrm>
+            <a:off x="1024128" y="585216"/>
+            <a:ext cx="9893254" cy="1499616"/>
+          </a:xfrm>
+        </p:spPr>
+        <p:txBody>
+          <a:bodyPr/>
+          <a:lstStyle/>
+          <a:p>
+            <a:r>
+              <a:rPr lang="ru-RU" dirty="0"/>
+              <a:t>Методы распознавания текста</a:t>
+            </a:r>
+          </a:p>
+        </p:txBody>
+      </p:sp>
+      <p:sp>
+        <p:nvSpPr>
+          <p:cNvPr id="3" name="Объект 2">
+            <a:extLst>
+              <a:ext uri="{FF2B5EF4-FFF2-40B4-BE49-F238E27FC236}">
+                <a16:creationId xmlns:a16="http://schemas.microsoft.com/office/drawing/2014/main" id="{2CB90470-5C9C-4A44-9FC7-735AFBA66920}"/>
+              </a:ext>
+            </a:extLst>
+          </p:cNvPr>
+          <p:cNvSpPr>
+            <a:spLocks noGrp="1"/>
+          </p:cNvSpPr>
+          <p:nvPr>
+            <p:ph idx="1"/>
+          </p:nvPr>
+        </p:nvSpPr>
+        <p:spPr/>
+        <p:txBody>
+          <a:bodyPr/>
+          <a:lstStyle/>
+          <a:p>
+            <a:pPr marL="457200" indent="-457200">
+              <a:spcAft>
+                <a:spcPts val="1200"/>
+              </a:spcAft>
+              <a:buFont typeface="+mj-lt"/>
+              <a:buAutoNum type="arabicPeriod"/>
+            </a:pPr>
+            <a:r>
+              <a:rPr lang="ru-RU" b="1" dirty="0"/>
+              <a:t>Шаблонные методы</a:t>
+            </a:r>
+            <a:r>
+              <a:rPr lang="ru-RU" dirty="0"/>
+              <a:t> – сравнение распознанного объекта с подготовленными шаблонами.</a:t>
+            </a:r>
+          </a:p>
+          <a:p>
+            <a:pPr marL="457200" indent="-457200">
+              <a:spcAft>
+                <a:spcPts val="1200"/>
+              </a:spcAft>
+              <a:buFont typeface="+mj-lt"/>
+              <a:buAutoNum type="arabicPeriod"/>
+            </a:pPr>
+            <a:r>
+              <a:rPr lang="ru-RU" b="1" dirty="0"/>
+              <a:t>Признаковые методы</a:t>
+            </a:r>
+            <a:r>
+              <a:rPr lang="ru-RU" dirty="0"/>
+              <a:t> – распознавание, которое использует критерии распознаваемого объекта.</a:t>
+            </a:r>
+          </a:p>
+          <a:p>
+            <a:pPr marL="457200" indent="-457200">
+              <a:spcAft>
+                <a:spcPts val="1200"/>
+              </a:spcAft>
+              <a:buFont typeface="+mj-lt"/>
+              <a:buAutoNum type="arabicPeriod"/>
+            </a:pPr>
+            <a:r>
+              <a:rPr lang="ru-RU" b="1" dirty="0"/>
+              <a:t>Структурные методы</a:t>
+            </a:r>
+            <a:r>
+              <a:rPr lang="ru-RU" dirty="0"/>
+              <a:t> – распознавание, основанное на структуре объекта.</a:t>
+            </a:r>
+          </a:p>
+          <a:p>
+            <a:pPr marL="457200" indent="-457200">
+              <a:spcAft>
+                <a:spcPts val="1200"/>
+              </a:spcAft>
+              <a:buFont typeface="+mj-lt"/>
+              <a:buAutoNum type="arabicPeriod"/>
+            </a:pPr>
+            <a:r>
+              <a:rPr lang="ru-RU" b="1" dirty="0" err="1"/>
+              <a:t>Нейросетевые</a:t>
+            </a:r>
+            <a:r>
+              <a:rPr lang="ru-RU" b="1" dirty="0"/>
+              <a:t> методы</a:t>
+            </a:r>
+            <a:r>
+              <a:rPr lang="ru-RU" dirty="0"/>
+              <a:t> – распознавание при помощи нейронных сетей или самообучающихся алгоритмов.</a:t>
+            </a:r>
+          </a:p>
+          <a:p>
+            <a:endParaRPr lang="ru-RU" dirty="0"/>
+          </a:p>
+        </p:txBody>
+      </p:sp>
+    </p:spTree>
+    <p:extLst>
+      <p:ext uri="{BB962C8B-B14F-4D97-AF65-F5344CB8AC3E}">
+        <p14:creationId xmlns:p14="http://schemas.microsoft.com/office/powerpoint/2010/main" val="3443952553"/>
+      </p:ext>
+    </p:extLst>
+  </p:cSld>
+  <p:clrMapOvr>
+    <a:masterClrMapping/>
+  </p:clrMapOvr>
+</p:sld>
+</file>
+
+<file path=ppt/slides/slide5.xml><?xml version="1.0" encoding="utf-8"?>
+<p:sld xmlns:a="http://schemas.openxmlformats.org/drawingml/2006/main" xmlns:r="http://schemas.openxmlformats.org/officeDocument/2006/relationships" xmlns:p="http://schemas.openxmlformats.org/presentationml/2006/main">
+  <p:cSld>
+    <p:spTree>
+      <p:nvGrpSpPr>
+        <p:cNvPr id="1" name=""/>
+        <p:cNvGrpSpPr/>
+        <p:nvPr/>
+      </p:nvGrpSpPr>
+      <p:grpSpPr>
+        <a:xfrm>
+          <a:off x="0" y="0"/>
+          <a:ext cx="0" cy="0"/>
+          <a:chOff x="0" y="0"/>
+          <a:chExt cx="0" cy="0"/>
+        </a:xfrm>
+      </p:grpSpPr>
+      <p:sp>
+        <p:nvSpPr>
+          <p:cNvPr id="2" name="Заголовок 1">
+            <a:extLst>
+              <a:ext uri="{FF2B5EF4-FFF2-40B4-BE49-F238E27FC236}">
                 <a16:creationId xmlns:a16="http://schemas.microsoft.com/office/drawing/2014/main" id="{16981F19-1ACB-44BB-864B-012D90AA4B93}"/>
               </a:ext>
             </a:extLst>
@@ -7167,7 +7334,1541 @@
 </p:sld>
 </file>
 
-<file path=ppt/slides/slide5.xml><?xml version="1.0" encoding="utf-8"?>
+<file path=ppt/slides/slide6.xml><?xml version="1.0" encoding="utf-8"?>
+<p:sld xmlns:a="http://schemas.openxmlformats.org/drawingml/2006/main" xmlns:r="http://schemas.openxmlformats.org/officeDocument/2006/relationships" xmlns:p="http://schemas.openxmlformats.org/presentationml/2006/main">
+  <p:cSld>
+    <p:bg>
+      <p:bgPr>
+        <a:solidFill>
+          <a:schemeClr val="bg1"/>
+        </a:solidFill>
+        <a:effectLst/>
+      </p:bgPr>
+    </p:bg>
+    <p:spTree>
+      <p:nvGrpSpPr>
+        <p:cNvPr id="1" name=""/>
+        <p:cNvGrpSpPr/>
+        <p:nvPr/>
+      </p:nvGrpSpPr>
+      <p:grpSpPr>
+        <a:xfrm>
+          <a:off x="0" y="0"/>
+          <a:ext cx="0" cy="0"/>
+          <a:chOff x="0" y="0"/>
+          <a:chExt cx="0" cy="0"/>
+        </a:xfrm>
+      </p:grpSpPr>
+      <p:sp>
+        <p:nvSpPr>
+          <p:cNvPr id="23" name="Rectangle 22">
+            <a:extLst>
+              <a:ext uri="{FF2B5EF4-FFF2-40B4-BE49-F238E27FC236}">
+                <a16:creationId xmlns:a16="http://schemas.microsoft.com/office/drawing/2014/main" id="{8880BE9B-2849-495A-AB0E-E80D71B324A8}"/>
+              </a:ext>
+              <a:ext uri="{C183D7F6-B498-43B3-948B-1728B52AA6E4}">
+                <adec:decorative xmlns:adec="http://schemas.microsoft.com/office/drawing/2017/decorative" val="1"/>
+              </a:ext>
+            </a:extLst>
+          </p:cNvPr>
+          <p:cNvSpPr>
+            <a:spLocks noGrp="1" noRot="1" noChangeAspect="1" noMove="1" noResize="1" noEditPoints="1" noAdjustHandles="1" noChangeArrowheads="1" noChangeShapeType="1" noTextEdit="1"/>
+          </p:cNvSpPr>
+          <p:nvPr>
+            <p:extLst>
+              <p:ext uri="{386F3935-93C4-4BCD-93E2-E3B085C9AB24}">
+                <p16:designElem xmlns:p16="http://schemas.microsoft.com/office/powerpoint/2015/main" val="1"/>
+              </p:ext>
+            </p:extLst>
+          </p:nvPr>
+        </p:nvSpPr>
+        <p:spPr>
+          <a:xfrm>
+            <a:off x="0" y="-2"/>
+            <a:ext cx="4069936" cy="6858002"/>
+          </a:xfrm>
+          <a:prstGeom prst="rect">
+            <a:avLst/>
+          </a:prstGeom>
+          <a:solidFill>
+            <a:schemeClr val="accent2"/>
+          </a:solidFill>
+          <a:ln>
+            <a:noFill/>
+          </a:ln>
+        </p:spPr>
+        <p:style>
+          <a:lnRef idx="2">
+            <a:schemeClr val="accent1">
+              <a:shade val="50000"/>
+            </a:schemeClr>
+          </a:lnRef>
+          <a:fillRef idx="1">
+            <a:schemeClr val="accent1"/>
+          </a:fillRef>
+          <a:effectRef idx="0">
+            <a:schemeClr val="accent1"/>
+          </a:effectRef>
+          <a:fontRef idx="minor">
+            <a:schemeClr val="lt1"/>
+          </a:fontRef>
+        </p:style>
+        <p:txBody>
+          <a:bodyPr rtlCol="0" anchor="ctr"/>
+          <a:lstStyle/>
+          <a:p>
+            <a:pPr algn="ctr"/>
+            <a:endParaRPr lang="en-US"/>
+          </a:p>
+        </p:txBody>
+      </p:sp>
+      <p:sp>
+        <p:nvSpPr>
+          <p:cNvPr id="2" name="Заголовок 1">
+            <a:extLst>
+              <a:ext uri="{FF2B5EF4-FFF2-40B4-BE49-F238E27FC236}">
+                <a16:creationId xmlns:a16="http://schemas.microsoft.com/office/drawing/2014/main" id="{7AF400E4-3D45-4FEE-A14F-DD94E170DDA8}"/>
+              </a:ext>
+            </a:extLst>
+          </p:cNvPr>
+          <p:cNvSpPr>
+            <a:spLocks noGrp="1"/>
+          </p:cNvSpPr>
+          <p:nvPr>
+            <p:ph type="title"/>
+          </p:nvPr>
+        </p:nvSpPr>
+        <p:spPr>
+          <a:xfrm>
+            <a:off x="310039" y="640080"/>
+            <a:ext cx="3429855" cy="731520"/>
+          </a:xfrm>
+        </p:spPr>
+        <p:txBody>
+          <a:bodyPr anchor="t">
+            <a:normAutofit/>
+          </a:bodyPr>
+          <a:lstStyle/>
+          <a:p>
+            <a:r>
+              <a:rPr lang="en-US" spc="600" dirty="0">
+                <a:solidFill>
+                  <a:srgbClr val="FFFFFF"/>
+                </a:solidFill>
+              </a:rPr>
+              <a:t>tesseract</a:t>
+            </a:r>
+            <a:endParaRPr lang="ru-RU" spc="600" dirty="0">
+              <a:solidFill>
+                <a:srgbClr val="FFFFFF"/>
+              </a:solidFill>
+            </a:endParaRPr>
+          </a:p>
+        </p:txBody>
+      </p:sp>
+      <p:pic>
+        <p:nvPicPr>
+          <p:cNvPr id="4" name="Объект 3">
+            <a:extLst>
+              <a:ext uri="{FF2B5EF4-FFF2-40B4-BE49-F238E27FC236}">
+                <a16:creationId xmlns:a16="http://schemas.microsoft.com/office/drawing/2014/main" id="{951FDFED-0DCE-44E2-88E0-F2D2BB9EFC06}"/>
+              </a:ext>
+            </a:extLst>
+          </p:cNvPr>
+          <p:cNvPicPr>
+            <a:picLocks noChangeAspect="1"/>
+          </p:cNvPicPr>
+          <p:nvPr/>
+        </p:nvPicPr>
+        <p:blipFill rotWithShape="1">
+          <a:blip r:embed="rId2"/>
+          <a:srcRect l="-269" r="-15" b="-984"/>
+          <a:stretch/>
+        </p:blipFill>
+        <p:spPr>
+          <a:xfrm>
+            <a:off x="4294950" y="1864591"/>
+            <a:ext cx="7587011" cy="3128817"/>
+          </a:xfrm>
+          <a:prstGeom prst="rect">
+            <a:avLst/>
+          </a:prstGeom>
+        </p:spPr>
+      </p:pic>
+      <p:sp>
+        <p:nvSpPr>
+          <p:cNvPr id="5" name="TextBox 4">
+            <a:extLst>
+              <a:ext uri="{FF2B5EF4-FFF2-40B4-BE49-F238E27FC236}">
+                <a16:creationId xmlns:a16="http://schemas.microsoft.com/office/drawing/2014/main" id="{AF5A3DBF-E1B4-44AE-8A02-6EA589A75E6A}"/>
+              </a:ext>
+            </a:extLst>
+          </p:cNvPr>
+          <p:cNvSpPr txBox="1"/>
+          <p:nvPr/>
+        </p:nvSpPr>
+        <p:spPr>
+          <a:xfrm>
+            <a:off x="310039" y="1759527"/>
+            <a:ext cx="3429855" cy="4062651"/>
+          </a:xfrm>
+          <a:prstGeom prst="rect">
+            <a:avLst/>
+          </a:prstGeom>
+          <a:noFill/>
+        </p:spPr>
+        <p:txBody>
+          <a:bodyPr wrap="square" rtlCol="0">
+            <a:spAutoFit/>
+          </a:bodyPr>
+          <a:lstStyle/>
+          <a:p>
+            <a:pPr marL="342900" indent="-342900">
+              <a:spcAft>
+                <a:spcPts val="1200"/>
+              </a:spcAft>
+              <a:buFont typeface="+mj-lt"/>
+              <a:buAutoNum type="arabicPeriod"/>
+            </a:pPr>
+            <a:r>
+              <a:rPr lang="ru-RU" b="1" dirty="0"/>
+              <a:t>Поиск строк</a:t>
+            </a:r>
+            <a:endParaRPr lang="en-US" b="1" dirty="0"/>
+          </a:p>
+          <a:p>
+            <a:pPr marL="342900" indent="-342900">
+              <a:spcAft>
+                <a:spcPts val="1200"/>
+              </a:spcAft>
+              <a:buFont typeface="+mj-lt"/>
+              <a:buAutoNum type="arabicPeriod"/>
+            </a:pPr>
+            <a:r>
+              <a:rPr lang="ru-RU" b="1" dirty="0"/>
+              <a:t>Выбор базовой линии</a:t>
+            </a:r>
+            <a:endParaRPr lang="en-US" b="1" dirty="0"/>
+          </a:p>
+          <a:p>
+            <a:pPr marL="342900" indent="-342900">
+              <a:spcAft>
+                <a:spcPts val="1200"/>
+              </a:spcAft>
+              <a:buFont typeface="+mj-lt"/>
+              <a:buAutoNum type="arabicPeriod"/>
+            </a:pPr>
+            <a:r>
+              <a:rPr lang="ru-RU" b="1" dirty="0"/>
+              <a:t>Поиск слов</a:t>
+            </a:r>
+            <a:endParaRPr lang="en-US" b="1" dirty="0"/>
+          </a:p>
+          <a:p>
+            <a:pPr marL="342900" indent="-342900">
+              <a:spcAft>
+                <a:spcPts val="1200"/>
+              </a:spcAft>
+              <a:buFont typeface="+mj-lt"/>
+              <a:buAutoNum type="arabicPeriod"/>
+            </a:pPr>
+            <a:r>
+              <a:rPr lang="ru-RU" b="1" dirty="0"/>
+              <a:t>Определение фиксированного шага и разделение слова на буквы</a:t>
+            </a:r>
+          </a:p>
+          <a:p>
+            <a:pPr marL="342900" indent="-342900">
+              <a:spcAft>
+                <a:spcPts val="1200"/>
+              </a:spcAft>
+              <a:buFont typeface="+mj-lt"/>
+              <a:buAutoNum type="arabicPeriod"/>
+            </a:pPr>
+            <a:r>
+              <a:rPr lang="ru-RU" b="1" dirty="0"/>
+              <a:t>Сегментирование и распознавание слов</a:t>
+            </a:r>
+            <a:endParaRPr lang="en-US" b="1" dirty="0"/>
+          </a:p>
+          <a:p>
+            <a:pPr marL="342900" indent="-342900">
+              <a:spcAft>
+                <a:spcPts val="1200"/>
+              </a:spcAft>
+              <a:buFont typeface="+mj-lt"/>
+              <a:buAutoNum type="arabicPeriod"/>
+            </a:pPr>
+            <a:r>
+              <a:rPr lang="ru-RU" b="1" dirty="0"/>
+              <a:t>Разделение «слипшихся» и дефектных символов.</a:t>
+            </a:r>
+            <a:endParaRPr lang="en-US" b="1" dirty="0"/>
+          </a:p>
+          <a:p>
+            <a:pPr marL="342900" indent="-342900">
+              <a:spcAft>
+                <a:spcPts val="1200"/>
+              </a:spcAft>
+              <a:buFont typeface="+mj-lt"/>
+              <a:buAutoNum type="arabicPeriod"/>
+            </a:pPr>
+            <a:r>
+              <a:rPr lang="ru-RU" b="1" dirty="0"/>
+              <a:t>Классификация</a:t>
+            </a:r>
+            <a:endParaRPr lang="ru-RU" dirty="0"/>
+          </a:p>
+        </p:txBody>
+      </p:sp>
+      <p:pic>
+        <p:nvPicPr>
+          <p:cNvPr id="1026" name="Picture 2" descr="https://sun9-18.userapi.com/c855636/v855636107/2424fc/HSOpPcOnJ7k.jpg">
+            <a:extLst>
+              <a:ext uri="{FF2B5EF4-FFF2-40B4-BE49-F238E27FC236}">
+                <a16:creationId xmlns:a16="http://schemas.microsoft.com/office/drawing/2014/main" id="{CF6AD181-14E0-42DF-A969-104999FA8BB7}"/>
+              </a:ext>
+            </a:extLst>
+          </p:cNvPr>
+          <p:cNvPicPr>
+            <a:picLocks noChangeAspect="1" noChangeArrowheads="1"/>
+          </p:cNvPicPr>
+          <p:nvPr/>
+        </p:nvPicPr>
+        <p:blipFill rotWithShape="1">
+          <a:blip r:embed="rId3">
+            <a:extLst>
+              <a:ext uri="{28A0092B-C50C-407E-A947-70E740481C1C}">
+                <a14:useLocalDpi xmlns:a14="http://schemas.microsoft.com/office/drawing/2010/main" val="0"/>
+              </a:ext>
+            </a:extLst>
+          </a:blip>
+          <a:srcRect l="11497" t="21385" r="10727" b="27763"/>
+          <a:stretch/>
+        </p:blipFill>
+        <p:spPr bwMode="auto">
+          <a:xfrm>
+            <a:off x="4928838" y="2392976"/>
+            <a:ext cx="6667417" cy="2518754"/>
+          </a:xfrm>
+          <a:prstGeom prst="rect">
+            <a:avLst/>
+          </a:prstGeom>
+          <a:noFill/>
+          <a:extLst>
+            <a:ext uri="{909E8E84-426E-40DD-AFC4-6F175D3DCCD1}">
+              <a14:hiddenFill xmlns:a14="http://schemas.microsoft.com/office/drawing/2010/main">
+                <a:solidFill>
+                  <a:srgbClr val="FFFFFF"/>
+                </a:solidFill>
+              </a14:hiddenFill>
+            </a:ext>
+          </a:extLst>
+        </p:spPr>
+      </p:pic>
+      <p:pic>
+        <p:nvPicPr>
+          <p:cNvPr id="12" name="Рисунок 11">
+            <a:extLst>
+              <a:ext uri="{FF2B5EF4-FFF2-40B4-BE49-F238E27FC236}">
+                <a16:creationId xmlns:a16="http://schemas.microsoft.com/office/drawing/2014/main" id="{2BD25378-9A4C-4747-BB91-076BA091A616}"/>
+              </a:ext>
+            </a:extLst>
+          </p:cNvPr>
+          <p:cNvPicPr>
+            <a:picLocks noChangeAspect="1"/>
+          </p:cNvPicPr>
+          <p:nvPr/>
+        </p:nvPicPr>
+        <p:blipFill>
+          <a:blip r:embed="rId4"/>
+          <a:stretch>
+            <a:fillRect/>
+          </a:stretch>
+        </p:blipFill>
+        <p:spPr>
+          <a:xfrm>
+            <a:off x="4990275" y="1864591"/>
+            <a:ext cx="6544541" cy="3781290"/>
+          </a:xfrm>
+          <a:prstGeom prst="rect">
+            <a:avLst/>
+          </a:prstGeom>
+        </p:spPr>
+      </p:pic>
+      <p:pic>
+        <p:nvPicPr>
+          <p:cNvPr id="13" name="Рисунок 12">
+            <a:extLst>
+              <a:ext uri="{FF2B5EF4-FFF2-40B4-BE49-F238E27FC236}">
+                <a16:creationId xmlns:a16="http://schemas.microsoft.com/office/drawing/2014/main" id="{0401A86C-29F1-4323-942E-1E3507E88713}"/>
+              </a:ext>
+            </a:extLst>
+          </p:cNvPr>
+          <p:cNvPicPr>
+            <a:picLocks noChangeAspect="1"/>
+          </p:cNvPicPr>
+          <p:nvPr/>
+        </p:nvPicPr>
+        <p:blipFill rotWithShape="1">
+          <a:blip r:embed="rId5"/>
+          <a:srcRect l="19738" r="16543"/>
+          <a:stretch/>
+        </p:blipFill>
+        <p:spPr>
+          <a:xfrm>
+            <a:off x="6248400" y="1856598"/>
+            <a:ext cx="4170219" cy="3781440"/>
+          </a:xfrm>
+          <a:prstGeom prst="rect">
+            <a:avLst/>
+          </a:prstGeom>
+        </p:spPr>
+      </p:pic>
+      <p:pic>
+        <p:nvPicPr>
+          <p:cNvPr id="14" name="Рисунок 13">
+            <a:extLst>
+              <a:ext uri="{FF2B5EF4-FFF2-40B4-BE49-F238E27FC236}">
+                <a16:creationId xmlns:a16="http://schemas.microsoft.com/office/drawing/2014/main" id="{E2EDCDD5-E453-4206-8068-57ACCD449FFD}"/>
+              </a:ext>
+            </a:extLst>
+          </p:cNvPr>
+          <p:cNvPicPr>
+            <a:picLocks noChangeAspect="1"/>
+          </p:cNvPicPr>
+          <p:nvPr/>
+        </p:nvPicPr>
+        <p:blipFill rotWithShape="1">
+          <a:blip r:embed="rId6"/>
+          <a:srcRect l="30640" r="41830"/>
+          <a:stretch/>
+        </p:blipFill>
+        <p:spPr>
+          <a:xfrm>
+            <a:off x="7015630" y="1848755"/>
+            <a:ext cx="1801092" cy="3780000"/>
+          </a:xfrm>
+          <a:prstGeom prst="rect">
+            <a:avLst/>
+          </a:prstGeom>
+        </p:spPr>
+      </p:pic>
+      <p:pic>
+        <p:nvPicPr>
+          <p:cNvPr id="15" name="Рисунок 14">
+            <a:extLst>
+              <a:ext uri="{FF2B5EF4-FFF2-40B4-BE49-F238E27FC236}">
+                <a16:creationId xmlns:a16="http://schemas.microsoft.com/office/drawing/2014/main" id="{18FFD341-2AC1-4A83-A9EA-86A62E4C692A}"/>
+              </a:ext>
+            </a:extLst>
+          </p:cNvPr>
+          <p:cNvPicPr>
+            <a:picLocks noChangeAspect="1"/>
+          </p:cNvPicPr>
+          <p:nvPr/>
+        </p:nvPicPr>
+        <p:blipFill>
+          <a:blip r:embed="rId7"/>
+          <a:stretch>
+            <a:fillRect/>
+          </a:stretch>
+        </p:blipFill>
+        <p:spPr>
+          <a:xfrm>
+            <a:off x="4816055" y="1900132"/>
+            <a:ext cx="6544800" cy="3781440"/>
+          </a:xfrm>
+          <a:prstGeom prst="rect">
+            <a:avLst/>
+          </a:prstGeom>
+        </p:spPr>
+      </p:pic>
+      <p:pic>
+        <p:nvPicPr>
+          <p:cNvPr id="17" name="Рисунок 16">
+            <a:extLst>
+              <a:ext uri="{FF2B5EF4-FFF2-40B4-BE49-F238E27FC236}">
+                <a16:creationId xmlns:a16="http://schemas.microsoft.com/office/drawing/2014/main" id="{10DE0840-CD6A-46AA-9F49-106B3C8A3043}"/>
+              </a:ext>
+            </a:extLst>
+          </p:cNvPr>
+          <p:cNvPicPr>
+            <a:picLocks noChangeAspect="1"/>
+          </p:cNvPicPr>
+          <p:nvPr/>
+        </p:nvPicPr>
+        <p:blipFill>
+          <a:blip r:embed="rId8"/>
+          <a:stretch>
+            <a:fillRect/>
+          </a:stretch>
+        </p:blipFill>
+        <p:spPr>
+          <a:xfrm>
+            <a:off x="4895511" y="1705444"/>
+            <a:ext cx="6739299" cy="3893817"/>
+          </a:xfrm>
+          <a:prstGeom prst="rect">
+            <a:avLst/>
+          </a:prstGeom>
+        </p:spPr>
+      </p:pic>
+    </p:spTree>
+    <p:extLst>
+      <p:ext uri="{BB962C8B-B14F-4D97-AF65-F5344CB8AC3E}">
+        <p14:creationId xmlns:p14="http://schemas.microsoft.com/office/powerpoint/2010/main" val="1734729570"/>
+      </p:ext>
+    </p:extLst>
+  </p:cSld>
+  <p:clrMapOvr>
+    <a:masterClrMapping/>
+  </p:clrMapOvr>
+  <p:timing>
+    <p:tnLst>
+      <p:par>
+        <p:cTn id="1" dur="indefinite" restart="never" nodeType="tmRoot">
+          <p:childTnLst>
+            <p:seq concurrent="1" nextAc="seek">
+              <p:cTn id="2" dur="indefinite" nodeType="mainSeq">
+                <p:childTnLst>
+                  <p:par>
+                    <p:cTn id="3" fill="hold">
+                      <p:stCondLst>
+                        <p:cond delay="indefinite"/>
+                      </p:stCondLst>
+                      <p:childTnLst>
+                        <p:par>
+                          <p:cTn id="4" fill="hold">
+                            <p:stCondLst>
+                              <p:cond delay="0"/>
+                            </p:stCondLst>
+                            <p:childTnLst>
+                              <p:par>
+                                <p:cTn id="5" presetID="10" presetClass="entr" presetSubtype="0" fill="hold" grpId="0" nodeType="clickEffect">
+                                  <p:stCondLst>
+                                    <p:cond delay="0"/>
+                                  </p:stCondLst>
+                                  <p:childTnLst>
+                                    <p:set>
+                                      <p:cBhvr>
+                                        <p:cTn id="6" dur="1" fill="hold">
+                                          <p:stCondLst>
+                                            <p:cond delay="0"/>
+                                          </p:stCondLst>
+                                        </p:cTn>
+                                        <p:tgtEl>
+                                          <p:spTgt spid="5">
+                                            <p:txEl>
+                                              <p:pRg st="0" end="0"/>
+                                            </p:txEl>
+                                          </p:spTgt>
+                                        </p:tgtEl>
+                                        <p:attrNameLst>
+                                          <p:attrName>style.visibility</p:attrName>
+                                        </p:attrNameLst>
+                                      </p:cBhvr>
+                                      <p:to>
+                                        <p:strVal val="visible"/>
+                                      </p:to>
+                                    </p:set>
+                                    <p:animEffect transition="in" filter="fade">
+                                      <p:cBhvr>
+                                        <p:cTn id="7" dur="500"/>
+                                        <p:tgtEl>
+                                          <p:spTgt spid="5">
+                                            <p:txEl>
+                                              <p:pRg st="0" end="0"/>
+                                            </p:txEl>
+                                          </p:spTgt>
+                                        </p:tgtEl>
+                                      </p:cBhvr>
+                                    </p:animEffect>
+                                  </p:childTnLst>
+                                </p:cTn>
+                              </p:par>
+                            </p:childTnLst>
+                          </p:cTn>
+                        </p:par>
+                      </p:childTnLst>
+                    </p:cTn>
+                  </p:par>
+                  <p:par>
+                    <p:cTn id="8" fill="hold">
+                      <p:stCondLst>
+                        <p:cond delay="indefinite"/>
+                      </p:stCondLst>
+                      <p:childTnLst>
+                        <p:par>
+                          <p:cTn id="9" fill="hold">
+                            <p:stCondLst>
+                              <p:cond delay="0"/>
+                            </p:stCondLst>
+                            <p:childTnLst>
+                              <p:par>
+                                <p:cTn id="10" presetID="10" presetClass="entr" presetSubtype="0" fill="hold" grpId="1" nodeType="clickEffect">
+                                  <p:stCondLst>
+                                    <p:cond delay="0"/>
+                                  </p:stCondLst>
+                                  <p:childTnLst>
+                                    <p:set>
+                                      <p:cBhvr>
+                                        <p:cTn id="11" dur="1" fill="hold">
+                                          <p:stCondLst>
+                                            <p:cond delay="0"/>
+                                          </p:stCondLst>
+                                        </p:cTn>
+                                        <p:tgtEl>
+                                          <p:spTgt spid="5">
+                                            <p:txEl>
+                                              <p:pRg st="1" end="1"/>
+                                            </p:txEl>
+                                          </p:spTgt>
+                                        </p:tgtEl>
+                                        <p:attrNameLst>
+                                          <p:attrName>style.visibility</p:attrName>
+                                        </p:attrNameLst>
+                                      </p:cBhvr>
+                                      <p:to>
+                                        <p:strVal val="visible"/>
+                                      </p:to>
+                                    </p:set>
+                                    <p:animEffect transition="in" filter="fade">
+                                      <p:cBhvr>
+                                        <p:cTn id="12" dur="500"/>
+                                        <p:tgtEl>
+                                          <p:spTgt spid="5">
+                                            <p:txEl>
+                                              <p:pRg st="1" end="1"/>
+                                            </p:txEl>
+                                          </p:spTgt>
+                                        </p:tgtEl>
+                                      </p:cBhvr>
+                                    </p:animEffect>
+                                  </p:childTnLst>
+                                </p:cTn>
+                              </p:par>
+                              <p:par>
+                                <p:cTn id="13" presetID="10" presetClass="exit" presetSubtype="0" fill="hold" nodeType="withEffect">
+                                  <p:stCondLst>
+                                    <p:cond delay="0"/>
+                                  </p:stCondLst>
+                                  <p:childTnLst>
+                                    <p:animEffect transition="out" filter="fade">
+                                      <p:cBhvr>
+                                        <p:cTn id="14" dur="500"/>
+                                        <p:tgtEl>
+                                          <p:spTgt spid="4"/>
+                                        </p:tgtEl>
+                                      </p:cBhvr>
+                                    </p:animEffect>
+                                    <p:set>
+                                      <p:cBhvr>
+                                        <p:cTn id="15" dur="1" fill="hold">
+                                          <p:stCondLst>
+                                            <p:cond delay="499"/>
+                                          </p:stCondLst>
+                                        </p:cTn>
+                                        <p:tgtEl>
+                                          <p:spTgt spid="4"/>
+                                        </p:tgtEl>
+                                        <p:attrNameLst>
+                                          <p:attrName>style.visibility</p:attrName>
+                                        </p:attrNameLst>
+                                      </p:cBhvr>
+                                      <p:to>
+                                        <p:strVal val="hidden"/>
+                                      </p:to>
+                                    </p:set>
+                                  </p:childTnLst>
+                                </p:cTn>
+                              </p:par>
+                            </p:childTnLst>
+                          </p:cTn>
+                        </p:par>
+                        <p:par>
+                          <p:cTn id="16" fill="hold">
+                            <p:stCondLst>
+                              <p:cond delay="500"/>
+                            </p:stCondLst>
+                            <p:childTnLst>
+                              <p:par>
+                                <p:cTn id="17" presetID="10" presetClass="entr" presetSubtype="0" fill="hold" nodeType="afterEffect">
+                                  <p:stCondLst>
+                                    <p:cond delay="0"/>
+                                  </p:stCondLst>
+                                  <p:childTnLst>
+                                    <p:set>
+                                      <p:cBhvr>
+                                        <p:cTn id="18" dur="1" fill="hold">
+                                          <p:stCondLst>
+                                            <p:cond delay="0"/>
+                                          </p:stCondLst>
+                                        </p:cTn>
+                                        <p:tgtEl>
+                                          <p:spTgt spid="1026"/>
+                                        </p:tgtEl>
+                                        <p:attrNameLst>
+                                          <p:attrName>style.visibility</p:attrName>
+                                        </p:attrNameLst>
+                                      </p:cBhvr>
+                                      <p:to>
+                                        <p:strVal val="visible"/>
+                                      </p:to>
+                                    </p:set>
+                                    <p:animEffect transition="in" filter="fade">
+                                      <p:cBhvr>
+                                        <p:cTn id="19" dur="500"/>
+                                        <p:tgtEl>
+                                          <p:spTgt spid="1026"/>
+                                        </p:tgtEl>
+                                      </p:cBhvr>
+                                    </p:animEffect>
+                                  </p:childTnLst>
+                                </p:cTn>
+                              </p:par>
+                            </p:childTnLst>
+                          </p:cTn>
+                        </p:par>
+                      </p:childTnLst>
+                    </p:cTn>
+                  </p:par>
+                  <p:par>
+                    <p:cTn id="20" fill="hold">
+                      <p:stCondLst>
+                        <p:cond delay="indefinite"/>
+                      </p:stCondLst>
+                      <p:childTnLst>
+                        <p:par>
+                          <p:cTn id="21" fill="hold">
+                            <p:stCondLst>
+                              <p:cond delay="0"/>
+                            </p:stCondLst>
+                            <p:childTnLst>
+                              <p:par>
+                                <p:cTn id="22" presetID="10" presetClass="entr" presetSubtype="0" fill="hold" grpId="2" nodeType="clickEffect">
+                                  <p:stCondLst>
+                                    <p:cond delay="0"/>
+                                  </p:stCondLst>
+                                  <p:childTnLst>
+                                    <p:set>
+                                      <p:cBhvr>
+                                        <p:cTn id="23" dur="1" fill="hold">
+                                          <p:stCondLst>
+                                            <p:cond delay="0"/>
+                                          </p:stCondLst>
+                                        </p:cTn>
+                                        <p:tgtEl>
+                                          <p:spTgt spid="5">
+                                            <p:txEl>
+                                              <p:pRg st="2" end="2"/>
+                                            </p:txEl>
+                                          </p:spTgt>
+                                        </p:tgtEl>
+                                        <p:attrNameLst>
+                                          <p:attrName>style.visibility</p:attrName>
+                                        </p:attrNameLst>
+                                      </p:cBhvr>
+                                      <p:to>
+                                        <p:strVal val="visible"/>
+                                      </p:to>
+                                    </p:set>
+                                    <p:animEffect transition="in" filter="fade">
+                                      <p:cBhvr>
+                                        <p:cTn id="24" dur="500"/>
+                                        <p:tgtEl>
+                                          <p:spTgt spid="5">
+                                            <p:txEl>
+                                              <p:pRg st="2" end="2"/>
+                                            </p:txEl>
+                                          </p:spTgt>
+                                        </p:tgtEl>
+                                      </p:cBhvr>
+                                    </p:animEffect>
+                                  </p:childTnLst>
+                                </p:cTn>
+                              </p:par>
+                            </p:childTnLst>
+                          </p:cTn>
+                        </p:par>
+                      </p:childTnLst>
+                    </p:cTn>
+                  </p:par>
+                  <p:par>
+                    <p:cTn id="25" fill="hold">
+                      <p:stCondLst>
+                        <p:cond delay="indefinite"/>
+                      </p:stCondLst>
+                      <p:childTnLst>
+                        <p:par>
+                          <p:cTn id="26" fill="hold">
+                            <p:stCondLst>
+                              <p:cond delay="0"/>
+                            </p:stCondLst>
+                            <p:childTnLst>
+                              <p:par>
+                                <p:cTn id="27" presetID="10" presetClass="entr" presetSubtype="0" fill="hold" grpId="3" nodeType="clickEffect">
+                                  <p:stCondLst>
+                                    <p:cond delay="0"/>
+                                  </p:stCondLst>
+                                  <p:childTnLst>
+                                    <p:set>
+                                      <p:cBhvr>
+                                        <p:cTn id="28" dur="1" fill="hold">
+                                          <p:stCondLst>
+                                            <p:cond delay="0"/>
+                                          </p:stCondLst>
+                                        </p:cTn>
+                                        <p:tgtEl>
+                                          <p:spTgt spid="5">
+                                            <p:txEl>
+                                              <p:pRg st="3" end="3"/>
+                                            </p:txEl>
+                                          </p:spTgt>
+                                        </p:tgtEl>
+                                        <p:attrNameLst>
+                                          <p:attrName>style.visibility</p:attrName>
+                                        </p:attrNameLst>
+                                      </p:cBhvr>
+                                      <p:to>
+                                        <p:strVal val="visible"/>
+                                      </p:to>
+                                    </p:set>
+                                    <p:animEffect transition="in" filter="fade">
+                                      <p:cBhvr>
+                                        <p:cTn id="29" dur="500"/>
+                                        <p:tgtEl>
+                                          <p:spTgt spid="5">
+                                            <p:txEl>
+                                              <p:pRg st="3" end="3"/>
+                                            </p:txEl>
+                                          </p:spTgt>
+                                        </p:tgtEl>
+                                      </p:cBhvr>
+                                    </p:animEffect>
+                                  </p:childTnLst>
+                                </p:cTn>
+                              </p:par>
+                              <p:par>
+                                <p:cTn id="30" presetID="10" presetClass="exit" presetSubtype="0" fill="hold" nodeType="withEffect">
+                                  <p:stCondLst>
+                                    <p:cond delay="0"/>
+                                  </p:stCondLst>
+                                  <p:childTnLst>
+                                    <p:animEffect transition="out" filter="fade">
+                                      <p:cBhvr>
+                                        <p:cTn id="31" dur="500"/>
+                                        <p:tgtEl>
+                                          <p:spTgt spid="1026"/>
+                                        </p:tgtEl>
+                                      </p:cBhvr>
+                                    </p:animEffect>
+                                    <p:set>
+                                      <p:cBhvr>
+                                        <p:cTn id="32" dur="1" fill="hold">
+                                          <p:stCondLst>
+                                            <p:cond delay="499"/>
+                                          </p:stCondLst>
+                                        </p:cTn>
+                                        <p:tgtEl>
+                                          <p:spTgt spid="1026"/>
+                                        </p:tgtEl>
+                                        <p:attrNameLst>
+                                          <p:attrName>style.visibility</p:attrName>
+                                        </p:attrNameLst>
+                                      </p:cBhvr>
+                                      <p:to>
+                                        <p:strVal val="hidden"/>
+                                      </p:to>
+                                    </p:set>
+                                  </p:childTnLst>
+                                </p:cTn>
+                              </p:par>
+                            </p:childTnLst>
+                          </p:cTn>
+                        </p:par>
+                        <p:par>
+                          <p:cTn id="33" fill="hold">
+                            <p:stCondLst>
+                              <p:cond delay="500"/>
+                            </p:stCondLst>
+                            <p:childTnLst>
+                              <p:par>
+                                <p:cTn id="34" presetID="10" presetClass="entr" presetSubtype="0" fill="hold" nodeType="afterEffect">
+                                  <p:stCondLst>
+                                    <p:cond delay="0"/>
+                                  </p:stCondLst>
+                                  <p:childTnLst>
+                                    <p:set>
+                                      <p:cBhvr>
+                                        <p:cTn id="35" dur="1" fill="hold">
+                                          <p:stCondLst>
+                                            <p:cond delay="0"/>
+                                          </p:stCondLst>
+                                        </p:cTn>
+                                        <p:tgtEl>
+                                          <p:spTgt spid="12"/>
+                                        </p:tgtEl>
+                                        <p:attrNameLst>
+                                          <p:attrName>style.visibility</p:attrName>
+                                        </p:attrNameLst>
+                                      </p:cBhvr>
+                                      <p:to>
+                                        <p:strVal val="visible"/>
+                                      </p:to>
+                                    </p:set>
+                                    <p:animEffect transition="in" filter="fade">
+                                      <p:cBhvr>
+                                        <p:cTn id="36" dur="500"/>
+                                        <p:tgtEl>
+                                          <p:spTgt spid="12"/>
+                                        </p:tgtEl>
+                                      </p:cBhvr>
+                                    </p:animEffect>
+                                  </p:childTnLst>
+                                </p:cTn>
+                              </p:par>
+                            </p:childTnLst>
+                          </p:cTn>
+                        </p:par>
+                      </p:childTnLst>
+                    </p:cTn>
+                  </p:par>
+                  <p:par>
+                    <p:cTn id="37" fill="hold">
+                      <p:stCondLst>
+                        <p:cond delay="indefinite"/>
+                      </p:stCondLst>
+                      <p:childTnLst>
+                        <p:par>
+                          <p:cTn id="38" fill="hold">
+                            <p:stCondLst>
+                              <p:cond delay="0"/>
+                            </p:stCondLst>
+                            <p:childTnLst>
+                              <p:par>
+                                <p:cTn id="39" presetID="10" presetClass="entr" presetSubtype="0" fill="hold" grpId="4" nodeType="clickEffect">
+                                  <p:stCondLst>
+                                    <p:cond delay="0"/>
+                                  </p:stCondLst>
+                                  <p:childTnLst>
+                                    <p:set>
+                                      <p:cBhvr>
+                                        <p:cTn id="40" dur="1" fill="hold">
+                                          <p:stCondLst>
+                                            <p:cond delay="0"/>
+                                          </p:stCondLst>
+                                        </p:cTn>
+                                        <p:tgtEl>
+                                          <p:spTgt spid="5">
+                                            <p:txEl>
+                                              <p:pRg st="4" end="4"/>
+                                            </p:txEl>
+                                          </p:spTgt>
+                                        </p:tgtEl>
+                                        <p:attrNameLst>
+                                          <p:attrName>style.visibility</p:attrName>
+                                        </p:attrNameLst>
+                                      </p:cBhvr>
+                                      <p:to>
+                                        <p:strVal val="visible"/>
+                                      </p:to>
+                                    </p:set>
+                                    <p:animEffect transition="in" filter="fade">
+                                      <p:cBhvr>
+                                        <p:cTn id="41" dur="500"/>
+                                        <p:tgtEl>
+                                          <p:spTgt spid="5">
+                                            <p:txEl>
+                                              <p:pRg st="4" end="4"/>
+                                            </p:txEl>
+                                          </p:spTgt>
+                                        </p:tgtEl>
+                                      </p:cBhvr>
+                                    </p:animEffect>
+                                  </p:childTnLst>
+                                </p:cTn>
+                              </p:par>
+                            </p:childTnLst>
+                          </p:cTn>
+                        </p:par>
+                      </p:childTnLst>
+                    </p:cTn>
+                  </p:par>
+                  <p:par>
+                    <p:cTn id="42" fill="hold">
+                      <p:stCondLst>
+                        <p:cond delay="indefinite"/>
+                      </p:stCondLst>
+                      <p:childTnLst>
+                        <p:par>
+                          <p:cTn id="43" fill="hold">
+                            <p:stCondLst>
+                              <p:cond delay="0"/>
+                            </p:stCondLst>
+                            <p:childTnLst>
+                              <p:par>
+                                <p:cTn id="44" presetID="1" presetClass="exit" presetSubtype="0" fill="hold" nodeType="clickEffect">
+                                  <p:stCondLst>
+                                    <p:cond delay="0"/>
+                                  </p:stCondLst>
+                                  <p:childTnLst>
+                                    <p:set>
+                                      <p:cBhvr>
+                                        <p:cTn id="45" dur="1" fill="hold">
+                                          <p:stCondLst>
+                                            <p:cond delay="0"/>
+                                          </p:stCondLst>
+                                        </p:cTn>
+                                        <p:tgtEl>
+                                          <p:spTgt spid="12"/>
+                                        </p:tgtEl>
+                                        <p:attrNameLst>
+                                          <p:attrName>style.visibility</p:attrName>
+                                        </p:attrNameLst>
+                                      </p:cBhvr>
+                                      <p:to>
+                                        <p:strVal val="hidden"/>
+                                      </p:to>
+                                    </p:set>
+                                  </p:childTnLst>
+                                </p:cTn>
+                              </p:par>
+                            </p:childTnLst>
+                          </p:cTn>
+                        </p:par>
+                        <p:par>
+                          <p:cTn id="46" fill="hold">
+                            <p:stCondLst>
+                              <p:cond delay="0"/>
+                            </p:stCondLst>
+                            <p:childTnLst>
+                              <p:par>
+                                <p:cTn id="47" presetID="1" presetClass="entr" presetSubtype="0" fill="hold" nodeType="afterEffect">
+                                  <p:stCondLst>
+                                    <p:cond delay="0"/>
+                                  </p:stCondLst>
+                                  <p:childTnLst>
+                                    <p:set>
+                                      <p:cBhvr>
+                                        <p:cTn id="48" dur="1" fill="hold">
+                                          <p:stCondLst>
+                                            <p:cond delay="0"/>
+                                          </p:stCondLst>
+                                        </p:cTn>
+                                        <p:tgtEl>
+                                          <p:spTgt spid="13"/>
+                                        </p:tgtEl>
+                                        <p:attrNameLst>
+                                          <p:attrName>style.visibility</p:attrName>
+                                        </p:attrNameLst>
+                                      </p:cBhvr>
+                                      <p:to>
+                                        <p:strVal val="visible"/>
+                                      </p:to>
+                                    </p:set>
+                                  </p:childTnLst>
+                                </p:cTn>
+                              </p:par>
+                            </p:childTnLst>
+                          </p:cTn>
+                        </p:par>
+                      </p:childTnLst>
+                    </p:cTn>
+                  </p:par>
+                  <p:par>
+                    <p:cTn id="49" fill="hold">
+                      <p:stCondLst>
+                        <p:cond delay="indefinite"/>
+                      </p:stCondLst>
+                      <p:childTnLst>
+                        <p:par>
+                          <p:cTn id="50" fill="hold">
+                            <p:stCondLst>
+                              <p:cond delay="0"/>
+                            </p:stCondLst>
+                            <p:childTnLst>
+                              <p:par>
+                                <p:cTn id="51" presetID="1" presetClass="exit" presetSubtype="0" fill="hold" nodeType="clickEffect">
+                                  <p:stCondLst>
+                                    <p:cond delay="0"/>
+                                  </p:stCondLst>
+                                  <p:childTnLst>
+                                    <p:set>
+                                      <p:cBhvr>
+                                        <p:cTn id="52" dur="1" fill="hold">
+                                          <p:stCondLst>
+                                            <p:cond delay="0"/>
+                                          </p:stCondLst>
+                                        </p:cTn>
+                                        <p:tgtEl>
+                                          <p:spTgt spid="13"/>
+                                        </p:tgtEl>
+                                        <p:attrNameLst>
+                                          <p:attrName>style.visibility</p:attrName>
+                                        </p:attrNameLst>
+                                      </p:cBhvr>
+                                      <p:to>
+                                        <p:strVal val="hidden"/>
+                                      </p:to>
+                                    </p:set>
+                                  </p:childTnLst>
+                                </p:cTn>
+                              </p:par>
+                            </p:childTnLst>
+                          </p:cTn>
+                        </p:par>
+                        <p:par>
+                          <p:cTn id="53" fill="hold">
+                            <p:stCondLst>
+                              <p:cond delay="0"/>
+                            </p:stCondLst>
+                            <p:childTnLst>
+                              <p:par>
+                                <p:cTn id="54" presetID="1" presetClass="entr" presetSubtype="0" fill="hold" nodeType="afterEffect">
+                                  <p:stCondLst>
+                                    <p:cond delay="0"/>
+                                  </p:stCondLst>
+                                  <p:childTnLst>
+                                    <p:set>
+                                      <p:cBhvr>
+                                        <p:cTn id="55" dur="1" fill="hold">
+                                          <p:stCondLst>
+                                            <p:cond delay="0"/>
+                                          </p:stCondLst>
+                                        </p:cTn>
+                                        <p:tgtEl>
+                                          <p:spTgt spid="14"/>
+                                        </p:tgtEl>
+                                        <p:attrNameLst>
+                                          <p:attrName>style.visibility</p:attrName>
+                                        </p:attrNameLst>
+                                      </p:cBhvr>
+                                      <p:to>
+                                        <p:strVal val="visible"/>
+                                      </p:to>
+                                    </p:set>
+                                  </p:childTnLst>
+                                </p:cTn>
+                              </p:par>
+                            </p:childTnLst>
+                          </p:cTn>
+                        </p:par>
+                      </p:childTnLst>
+                    </p:cTn>
+                  </p:par>
+                  <p:par>
+                    <p:cTn id="56" fill="hold">
+                      <p:stCondLst>
+                        <p:cond delay="indefinite"/>
+                      </p:stCondLst>
+                      <p:childTnLst>
+                        <p:par>
+                          <p:cTn id="57" fill="hold">
+                            <p:stCondLst>
+                              <p:cond delay="0"/>
+                            </p:stCondLst>
+                            <p:childTnLst>
+                              <p:par>
+                                <p:cTn id="58" presetID="10" presetClass="entr" presetSubtype="0" fill="hold" grpId="5" nodeType="clickEffect">
+                                  <p:stCondLst>
+                                    <p:cond delay="0"/>
+                                  </p:stCondLst>
+                                  <p:childTnLst>
+                                    <p:set>
+                                      <p:cBhvr>
+                                        <p:cTn id="59" dur="1" fill="hold">
+                                          <p:stCondLst>
+                                            <p:cond delay="0"/>
+                                          </p:stCondLst>
+                                        </p:cTn>
+                                        <p:tgtEl>
+                                          <p:spTgt spid="5">
+                                            <p:txEl>
+                                              <p:pRg st="5" end="5"/>
+                                            </p:txEl>
+                                          </p:spTgt>
+                                        </p:tgtEl>
+                                        <p:attrNameLst>
+                                          <p:attrName>style.visibility</p:attrName>
+                                        </p:attrNameLst>
+                                      </p:cBhvr>
+                                      <p:to>
+                                        <p:strVal val="visible"/>
+                                      </p:to>
+                                    </p:set>
+                                    <p:animEffect transition="in" filter="fade">
+                                      <p:cBhvr>
+                                        <p:cTn id="60" dur="500"/>
+                                        <p:tgtEl>
+                                          <p:spTgt spid="5">
+                                            <p:txEl>
+                                              <p:pRg st="5" end="5"/>
+                                            </p:txEl>
+                                          </p:spTgt>
+                                        </p:tgtEl>
+                                      </p:cBhvr>
+                                    </p:animEffect>
+                                  </p:childTnLst>
+                                </p:cTn>
+                              </p:par>
+                              <p:par>
+                                <p:cTn id="61" presetID="10" presetClass="exit" presetSubtype="0" fill="hold" nodeType="withEffect">
+                                  <p:stCondLst>
+                                    <p:cond delay="0"/>
+                                  </p:stCondLst>
+                                  <p:childTnLst>
+                                    <p:animEffect transition="out" filter="fade">
+                                      <p:cBhvr>
+                                        <p:cTn id="62" dur="500"/>
+                                        <p:tgtEl>
+                                          <p:spTgt spid="14"/>
+                                        </p:tgtEl>
+                                      </p:cBhvr>
+                                    </p:animEffect>
+                                    <p:set>
+                                      <p:cBhvr>
+                                        <p:cTn id="63" dur="1" fill="hold">
+                                          <p:stCondLst>
+                                            <p:cond delay="499"/>
+                                          </p:stCondLst>
+                                        </p:cTn>
+                                        <p:tgtEl>
+                                          <p:spTgt spid="14"/>
+                                        </p:tgtEl>
+                                        <p:attrNameLst>
+                                          <p:attrName>style.visibility</p:attrName>
+                                        </p:attrNameLst>
+                                      </p:cBhvr>
+                                      <p:to>
+                                        <p:strVal val="hidden"/>
+                                      </p:to>
+                                    </p:set>
+                                  </p:childTnLst>
+                                </p:cTn>
+                              </p:par>
+                            </p:childTnLst>
+                          </p:cTn>
+                        </p:par>
+                        <p:par>
+                          <p:cTn id="64" fill="hold">
+                            <p:stCondLst>
+                              <p:cond delay="500"/>
+                            </p:stCondLst>
+                            <p:childTnLst>
+                              <p:par>
+                                <p:cTn id="65" presetID="10" presetClass="entr" presetSubtype="0" fill="hold" nodeType="afterEffect">
+                                  <p:stCondLst>
+                                    <p:cond delay="0"/>
+                                  </p:stCondLst>
+                                  <p:childTnLst>
+                                    <p:set>
+                                      <p:cBhvr>
+                                        <p:cTn id="66" dur="1" fill="hold">
+                                          <p:stCondLst>
+                                            <p:cond delay="0"/>
+                                          </p:stCondLst>
+                                        </p:cTn>
+                                        <p:tgtEl>
+                                          <p:spTgt spid="15"/>
+                                        </p:tgtEl>
+                                        <p:attrNameLst>
+                                          <p:attrName>style.visibility</p:attrName>
+                                        </p:attrNameLst>
+                                      </p:cBhvr>
+                                      <p:to>
+                                        <p:strVal val="visible"/>
+                                      </p:to>
+                                    </p:set>
+                                    <p:animEffect transition="in" filter="fade">
+                                      <p:cBhvr>
+                                        <p:cTn id="67" dur="500"/>
+                                        <p:tgtEl>
+                                          <p:spTgt spid="15"/>
+                                        </p:tgtEl>
+                                      </p:cBhvr>
+                                    </p:animEffect>
+                                  </p:childTnLst>
+                                </p:cTn>
+                              </p:par>
+                            </p:childTnLst>
+                          </p:cTn>
+                        </p:par>
+                      </p:childTnLst>
+                    </p:cTn>
+                  </p:par>
+                  <p:par>
+                    <p:cTn id="68" fill="hold">
+                      <p:stCondLst>
+                        <p:cond delay="indefinite"/>
+                      </p:stCondLst>
+                      <p:childTnLst>
+                        <p:par>
+                          <p:cTn id="69" fill="hold">
+                            <p:stCondLst>
+                              <p:cond delay="0"/>
+                            </p:stCondLst>
+                            <p:childTnLst>
+                              <p:par>
+                                <p:cTn id="70" presetID="10" presetClass="exit" presetSubtype="0" fill="hold" nodeType="clickEffect">
+                                  <p:stCondLst>
+                                    <p:cond delay="0"/>
+                                  </p:stCondLst>
+                                  <p:childTnLst>
+                                    <p:animEffect transition="out" filter="fade">
+                                      <p:cBhvr>
+                                        <p:cTn id="71" dur="500"/>
+                                        <p:tgtEl>
+                                          <p:spTgt spid="15"/>
+                                        </p:tgtEl>
+                                      </p:cBhvr>
+                                    </p:animEffect>
+                                    <p:set>
+                                      <p:cBhvr>
+                                        <p:cTn id="72" dur="1" fill="hold">
+                                          <p:stCondLst>
+                                            <p:cond delay="499"/>
+                                          </p:stCondLst>
+                                        </p:cTn>
+                                        <p:tgtEl>
+                                          <p:spTgt spid="15"/>
+                                        </p:tgtEl>
+                                        <p:attrNameLst>
+                                          <p:attrName>style.visibility</p:attrName>
+                                        </p:attrNameLst>
+                                      </p:cBhvr>
+                                      <p:to>
+                                        <p:strVal val="hidden"/>
+                                      </p:to>
+                                    </p:set>
+                                  </p:childTnLst>
+                                </p:cTn>
+                              </p:par>
+                            </p:childTnLst>
+                          </p:cTn>
+                        </p:par>
+                        <p:par>
+                          <p:cTn id="73" fill="hold">
+                            <p:stCondLst>
+                              <p:cond delay="500"/>
+                            </p:stCondLst>
+                            <p:childTnLst>
+                              <p:par>
+                                <p:cTn id="74" presetID="10" presetClass="entr" presetSubtype="0" fill="hold" nodeType="afterEffect">
+                                  <p:stCondLst>
+                                    <p:cond delay="0"/>
+                                  </p:stCondLst>
+                                  <p:childTnLst>
+                                    <p:set>
+                                      <p:cBhvr>
+                                        <p:cTn id="75" dur="1" fill="hold">
+                                          <p:stCondLst>
+                                            <p:cond delay="0"/>
+                                          </p:stCondLst>
+                                        </p:cTn>
+                                        <p:tgtEl>
+                                          <p:spTgt spid="17"/>
+                                        </p:tgtEl>
+                                        <p:attrNameLst>
+                                          <p:attrName>style.visibility</p:attrName>
+                                        </p:attrNameLst>
+                                      </p:cBhvr>
+                                      <p:to>
+                                        <p:strVal val="visible"/>
+                                      </p:to>
+                                    </p:set>
+                                    <p:animEffect transition="in" filter="fade">
+                                      <p:cBhvr>
+                                        <p:cTn id="76" dur="500"/>
+                                        <p:tgtEl>
+                                          <p:spTgt spid="17"/>
+                                        </p:tgtEl>
+                                      </p:cBhvr>
+                                    </p:animEffect>
+                                  </p:childTnLst>
+                                </p:cTn>
+                              </p:par>
+                            </p:childTnLst>
+                          </p:cTn>
+                        </p:par>
+                      </p:childTnLst>
+                    </p:cTn>
+                  </p:par>
+                  <p:par>
+                    <p:cTn id="77" fill="hold">
+                      <p:stCondLst>
+                        <p:cond delay="indefinite"/>
+                      </p:stCondLst>
+                      <p:childTnLst>
+                        <p:par>
+                          <p:cTn id="78" fill="hold">
+                            <p:stCondLst>
+                              <p:cond delay="0"/>
+                            </p:stCondLst>
+                            <p:childTnLst>
+                              <p:par>
+                                <p:cTn id="79" presetID="10" presetClass="entr" presetSubtype="0" fill="hold" grpId="6" nodeType="clickEffect">
+                                  <p:stCondLst>
+                                    <p:cond delay="0"/>
+                                  </p:stCondLst>
+                                  <p:childTnLst>
+                                    <p:set>
+                                      <p:cBhvr>
+                                        <p:cTn id="80" dur="1" fill="hold">
+                                          <p:stCondLst>
+                                            <p:cond delay="0"/>
+                                          </p:stCondLst>
+                                        </p:cTn>
+                                        <p:tgtEl>
+                                          <p:spTgt spid="5">
+                                            <p:txEl>
+                                              <p:pRg st="6" end="6"/>
+                                            </p:txEl>
+                                          </p:spTgt>
+                                        </p:tgtEl>
+                                        <p:attrNameLst>
+                                          <p:attrName>style.visibility</p:attrName>
+                                        </p:attrNameLst>
+                                      </p:cBhvr>
+                                      <p:to>
+                                        <p:strVal val="visible"/>
+                                      </p:to>
+                                    </p:set>
+                                    <p:animEffect transition="in" filter="fade">
+                                      <p:cBhvr>
+                                        <p:cTn id="81" dur="500"/>
+                                        <p:tgtEl>
+                                          <p:spTgt spid="5">
+                                            <p:txEl>
+                                              <p:pRg st="6" end="6"/>
+                                            </p:txEl>
+                                          </p:spTgt>
+                                        </p:tgtEl>
+                                      </p:cBhvr>
+                                    </p:animEffect>
+                                  </p:childTnLst>
+                                </p:cTn>
+                              </p:par>
+                              <p:par>
+                                <p:cTn id="82" presetID="10" presetClass="exit" presetSubtype="0" fill="hold" nodeType="withEffect">
+                                  <p:stCondLst>
+                                    <p:cond delay="0"/>
+                                  </p:stCondLst>
+                                  <p:childTnLst>
+                                    <p:animEffect transition="out" filter="fade">
+                                      <p:cBhvr>
+                                        <p:cTn id="83" dur="500"/>
+                                        <p:tgtEl>
+                                          <p:spTgt spid="17"/>
+                                        </p:tgtEl>
+                                      </p:cBhvr>
+                                    </p:animEffect>
+                                    <p:set>
+                                      <p:cBhvr>
+                                        <p:cTn id="84" dur="1" fill="hold">
+                                          <p:stCondLst>
+                                            <p:cond delay="499"/>
+                                          </p:stCondLst>
+                                        </p:cTn>
+                                        <p:tgtEl>
+                                          <p:spTgt spid="17"/>
+                                        </p:tgtEl>
+                                        <p:attrNameLst>
+                                          <p:attrName>style.visibility</p:attrName>
+                                        </p:attrNameLst>
+                                      </p:cBhvr>
+                                      <p:to>
+                                        <p:strVal val="hidden"/>
+                                      </p:to>
+                                    </p:set>
+                                  </p:childTnLst>
+                                </p:cTn>
+                              </p:par>
+                            </p:childTnLst>
+                          </p:cTn>
+                        </p:par>
+                        <p:par>
+                          <p:cTn id="85" fill="hold">
+                            <p:stCondLst>
+                              <p:cond delay="500"/>
+                            </p:stCondLst>
+                            <p:childTnLst>
+                              <p:par>
+                                <p:cTn id="86" presetID="10" presetClass="entr" presetSubtype="0" fill="hold" nodeType="afterEffect">
+                                  <p:stCondLst>
+                                    <p:cond delay="0"/>
+                                  </p:stCondLst>
+                                  <p:childTnLst>
+                                    <p:set>
+                                      <p:cBhvr>
+                                        <p:cTn id="87" dur="1" fill="hold">
+                                          <p:stCondLst>
+                                            <p:cond delay="0"/>
+                                          </p:stCondLst>
+                                        </p:cTn>
+                                        <p:tgtEl>
+                                          <p:spTgt spid="4"/>
+                                        </p:tgtEl>
+                                        <p:attrNameLst>
+                                          <p:attrName>style.visibility</p:attrName>
+                                        </p:attrNameLst>
+                                      </p:cBhvr>
+                                      <p:to>
+                                        <p:strVal val="visible"/>
+                                      </p:to>
+                                    </p:set>
+                                    <p:animEffect transition="in" filter="fade">
+                                      <p:cBhvr>
+                                        <p:cTn id="88" dur="500"/>
+                                        <p:tgtEl>
+                                          <p:spTgt spid="4"/>
+                                        </p:tgtEl>
+                                      </p:cBhvr>
+                                    </p:animEffect>
+                                  </p:childTnLst>
+                                </p:cTn>
+                              </p:par>
+                            </p:childTnLst>
+                          </p:cTn>
+                        </p:par>
+                      </p:childTnLst>
+                    </p:cTn>
+                  </p:par>
+                </p:childTnLst>
+              </p:cTn>
+              <p:prevCondLst>
+                <p:cond evt="onPrev" delay="0">
+                  <p:tgtEl>
+                    <p:sldTgt/>
+                  </p:tgtEl>
+                </p:cond>
+              </p:prevCondLst>
+              <p:nextCondLst>
+                <p:cond evt="onNext" delay="0">
+                  <p:tgtEl>
+                    <p:sldTgt/>
+                  </p:tgtEl>
+                </p:cond>
+              </p:nextCondLst>
+            </p:seq>
+          </p:childTnLst>
+        </p:cTn>
+      </p:par>
+    </p:tnLst>
+    <p:bldLst>
+      <p:bldP spid="5" grpId="0" uiExpand="1" build="p"/>
+      <p:bldP spid="5" grpId="1" uiExpand="1" build="allAtOnce"/>
+      <p:bldP spid="5" grpId="2" uiExpand="1" build="allAtOnce"/>
+      <p:bldP spid="5" grpId="3" uiExpand="1" build="allAtOnce"/>
+      <p:bldP spid="5" grpId="4" uiExpand="1" build="allAtOnce"/>
+      <p:bldP spid="5" grpId="5" uiExpand="1" build="allAtOnce"/>
+      <p:bldP spid="5" grpId="6" uiExpand="1" build="allAtOnce"/>
+    </p:bldLst>
+  </p:timing>
+</p:sld>
+</file>
+
+<file path=ppt/slides/slide7.xml><?xml version="1.0" encoding="utf-8"?>
 <p:sld xmlns:a="http://schemas.openxmlformats.org/drawingml/2006/main" xmlns:r="http://schemas.openxmlformats.org/officeDocument/2006/relationships" xmlns:p="http://schemas.openxmlformats.org/presentationml/2006/main">
   <p:cSld>
     <p:spTree>
@@ -7243,6 +8944,36 @@
           </a:graphicData>
         </a:graphic>
       </p:graphicFrame>
+      <p:pic>
+        <p:nvPicPr>
+          <p:cNvPr id="3" name="Рисунок 2">
+            <a:extLst>
+              <a:ext uri="{FF2B5EF4-FFF2-40B4-BE49-F238E27FC236}">
+                <a16:creationId xmlns:a16="http://schemas.microsoft.com/office/drawing/2014/main" id="{2B22F4AB-B2A9-4E9C-92AE-1E8A0B52E504}"/>
+              </a:ext>
+            </a:extLst>
+          </p:cNvPr>
+          <p:cNvPicPr>
+            <a:picLocks noChangeAspect="1"/>
+          </p:cNvPicPr>
+          <p:nvPr/>
+        </p:nvPicPr>
+        <p:blipFill>
+          <a:blip r:embed="rId7"/>
+          <a:stretch>
+            <a:fillRect/>
+          </a:stretch>
+        </p:blipFill>
+        <p:spPr>
+          <a:xfrm>
+            <a:off x="1613093" y="2350079"/>
+            <a:ext cx="8965811" cy="2943594"/>
+          </a:xfrm>
+          <a:prstGeom prst="rect">
+            <a:avLst/>
+          </a:prstGeom>
+        </p:spPr>
+      </p:pic>
     </p:spTree>
     <p:extLst>
       <p:ext uri="{BB962C8B-B14F-4D97-AF65-F5344CB8AC3E}">
@@ -7253,10 +8984,142 @@
   <p:clrMapOvr>
     <a:masterClrMapping/>
   </p:clrMapOvr>
+  <p:timing>
+    <p:tnLst>
+      <p:par>
+        <p:cTn id="1" dur="indefinite" restart="never" nodeType="tmRoot">
+          <p:childTnLst>
+            <p:seq concurrent="1" nextAc="seek">
+              <p:cTn id="2" dur="indefinite" nodeType="mainSeq">
+                <p:childTnLst>
+                  <p:par>
+                    <p:cTn id="3" fill="hold">
+                      <p:stCondLst>
+                        <p:cond delay="indefinite"/>
+                      </p:stCondLst>
+                      <p:childTnLst>
+                        <p:par>
+                          <p:cTn id="4" fill="hold">
+                            <p:stCondLst>
+                              <p:cond delay="0"/>
+                            </p:stCondLst>
+                            <p:childTnLst>
+                              <p:par>
+                                <p:cTn id="5" presetID="10" presetClass="exit" presetSubtype="0" fill="hold" grpId="0" nodeType="clickEffect">
+                                  <p:stCondLst>
+                                    <p:cond delay="0"/>
+                                  </p:stCondLst>
+                                  <p:childTnLst>
+                                    <p:animEffect transition="out" filter="fade">
+                                      <p:cBhvr>
+                                        <p:cTn id="6" dur="500"/>
+                                        <p:tgtEl>
+                                          <p:spTgt spid="6"/>
+                                        </p:tgtEl>
+                                      </p:cBhvr>
+                                    </p:animEffect>
+                                    <p:set>
+                                      <p:cBhvr>
+                                        <p:cTn id="7" dur="1" fill="hold">
+                                          <p:stCondLst>
+                                            <p:cond delay="499"/>
+                                          </p:stCondLst>
+                                        </p:cTn>
+                                        <p:tgtEl>
+                                          <p:spTgt spid="6"/>
+                                        </p:tgtEl>
+                                        <p:attrNameLst>
+                                          <p:attrName>style.visibility</p:attrName>
+                                        </p:attrNameLst>
+                                      </p:cBhvr>
+                                      <p:to>
+                                        <p:strVal val="hidden"/>
+                                      </p:to>
+                                    </p:set>
+                                  </p:childTnLst>
+                                </p:cTn>
+                              </p:par>
+                            </p:childTnLst>
+                          </p:cTn>
+                        </p:par>
+                        <p:par>
+                          <p:cTn id="8" fill="hold">
+                            <p:stCondLst>
+                              <p:cond delay="500"/>
+                            </p:stCondLst>
+                            <p:childTnLst>
+                              <p:par>
+                                <p:cTn id="9" presetID="10" presetClass="entr" presetSubtype="0" fill="hold" nodeType="afterEffect">
+                                  <p:stCondLst>
+                                    <p:cond delay="0"/>
+                                  </p:stCondLst>
+                                  <p:childTnLst>
+                                    <p:set>
+                                      <p:cBhvr>
+                                        <p:cTn id="10" dur="1" fill="hold">
+                                          <p:stCondLst>
+                                            <p:cond delay="0"/>
+                                          </p:stCondLst>
+                                        </p:cTn>
+                                        <p:tgtEl>
+                                          <p:spTgt spid="3"/>
+                                        </p:tgtEl>
+                                        <p:attrNameLst>
+                                          <p:attrName>style.visibility</p:attrName>
+                                        </p:attrNameLst>
+                                      </p:cBhvr>
+                                      <p:to>
+                                        <p:strVal val="visible"/>
+                                      </p:to>
+                                    </p:set>
+                                    <p:animEffect transition="in" filter="fade">
+                                      <p:cBhvr>
+                                        <p:cTn id="11" dur="500"/>
+                                        <p:tgtEl>
+                                          <p:spTgt spid="3"/>
+                                        </p:tgtEl>
+                                      </p:cBhvr>
+                                    </p:animEffect>
+                                  </p:childTnLst>
+                                </p:cTn>
+                              </p:par>
+                            </p:childTnLst>
+                          </p:cTn>
+                        </p:par>
+                      </p:childTnLst>
+                    </p:cTn>
+                  </p:par>
+                </p:childTnLst>
+              </p:cTn>
+              <p:prevCondLst>
+                <p:cond evt="onPrev" delay="0">
+                  <p:tgtEl>
+                    <p:sldTgt/>
+                  </p:tgtEl>
+                </p:cond>
+              </p:prevCondLst>
+              <p:nextCondLst>
+                <p:cond evt="onNext" delay="0">
+                  <p:tgtEl>
+                    <p:sldTgt/>
+                  </p:tgtEl>
+                </p:cond>
+              </p:nextCondLst>
+            </p:seq>
+          </p:childTnLst>
+        </p:cTn>
+      </p:par>
+    </p:tnLst>
+    <p:bldLst>
+      <p:bldGraphic spid="6" grpId="0">
+        <p:bldAsOne/>
+      </p:bldGraphic>
+    </p:bldLst>
+  </p:timing>
 </p:sld>
 </file>
 
-<file path=ppt/slides/slide6.xml><?xml version="1.0" encoding="utf-8"?>
+<file path=ppt/slides/slide8.xml><?xml version="1.0" encoding="utf-8"?>
 <p:sld xmlns:a="http://schemas.openxmlformats.org/drawingml/2006/main" xmlns:r="http://schemas.openxmlformats.org/officeDocument/2006/relationships" xmlns:p="http://schemas.openxmlformats.org/presentationml/2006/main">
   <p:cSld>
     <p:spTree>

</xml_diff>